<commit_message>
add project plan sample
</commit_message>
<xml_diff>
--- a/Documentation/BetaPresentation.pptx
+++ b/Documentation/BetaPresentation.pptx
@@ -308,7 +308,7 @@
             <a:fld id="{1E700B27-DE4C-4B9E-BB11-B9027034A00F}" type="datetimeFigureOut">
               <a:rPr lang="en-US" smtClean="0"/>
               <a:pPr/>
-              <a:t>4/4/2019</a:t>
+              <a:t>4/5/2019</a:t>
             </a:fld>
             <a:endParaRPr lang="en-US" dirty="0"/>
           </a:p>
@@ -589,7 +589,7 @@
           <a:p>
             <a:fld id="{C40F4739-9812-4A9F-890D-2AD6BA5F6EE8}" type="datetimeFigureOut">
               <a:rPr lang="en-US" smtClean="0"/>
-              <a:t>4/4/2019</a:t>
+              <a:t>4/5/2019</a:t>
             </a:fld>
             <a:endParaRPr lang="en-US" dirty="0"/>
           </a:p>
@@ -789,7 +789,7 @@
           <a:p>
             <a:fld id="{18845AC5-A3F8-44AA-BA8F-596CDCC976D3}" type="datetimeFigureOut">
               <a:rPr lang="en-US" smtClean="0"/>
-              <a:t>4/4/2019</a:t>
+              <a:t>4/5/2019</a:t>
             </a:fld>
             <a:endParaRPr lang="en-US" dirty="0"/>
           </a:p>
@@ -1063,7 +1063,7 @@
           <a:p>
             <a:fld id="{7E0D914D-B099-4142-A885-11F276715148}" type="datetimeFigureOut">
               <a:rPr lang="en-US" smtClean="0"/>
-              <a:t>4/4/2019</a:t>
+              <a:t>4/5/2019</a:t>
             </a:fld>
             <a:endParaRPr lang="en-US" dirty="0"/>
           </a:p>
@@ -1402,7 +1402,7 @@
           <a:p>
             <a:fld id="{174D01B4-0AA5-45E6-B2E6-5FA4078AEBCF}" type="datetimeFigureOut">
               <a:rPr lang="en-US" smtClean="0"/>
-              <a:t>4/4/2019</a:t>
+              <a:t>4/5/2019</a:t>
             </a:fld>
             <a:endParaRPr lang="en-US" dirty="0"/>
           </a:p>
@@ -2018,7 +2018,7 @@
           <a:p>
             <a:fld id="{4147335C-0450-40D7-8612-B3203BED4F28}" type="datetimeFigureOut">
               <a:rPr lang="en-US" smtClean="0"/>
-              <a:t>4/4/2019</a:t>
+              <a:t>4/5/2019</a:t>
             </a:fld>
             <a:endParaRPr lang="en-US" dirty="0"/>
           </a:p>
@@ -2871,7 +2871,7 @@
           <a:p>
             <a:fld id="{D246A105-2A1C-4284-B4EA-07CF89B1A393}" type="datetimeFigureOut">
               <a:rPr lang="en-US" smtClean="0"/>
-              <a:t>4/4/2019</a:t>
+              <a:t>4/5/2019</a:t>
             </a:fld>
             <a:endParaRPr lang="en-US" dirty="0"/>
           </a:p>
@@ -3047,7 +3047,7 @@
           <a:p>
             <a:fld id="{80DBE609-F3F2-45E6-BD6A-E03A8C86C1AE}" type="datetimeFigureOut">
               <a:rPr lang="en-US" smtClean="0"/>
-              <a:t>4/4/2019</a:t>
+              <a:t>4/5/2019</a:t>
             </a:fld>
             <a:endParaRPr lang="en-US" dirty="0"/>
           </a:p>
@@ -3233,7 +3233,7 @@
           <a:p>
             <a:fld id="{7A24AD68-089C-4467-A8F3-EA2BBCA6B44E}" type="datetimeFigureOut">
               <a:rPr lang="en-US" smtClean="0"/>
-              <a:t>4/4/2019</a:t>
+              <a:t>4/5/2019</a:t>
             </a:fld>
             <a:endParaRPr lang="en-US" dirty="0"/>
           </a:p>
@@ -3409,7 +3409,7 @@
           <a:p>
             <a:fld id="{75C51FCE-E4BB-4680-8E50-3C0E348D2609}" type="datetimeFigureOut">
               <a:rPr lang="en-US" smtClean="0"/>
-              <a:t>4/4/2019</a:t>
+              <a:t>4/5/2019</a:t>
             </a:fld>
             <a:endParaRPr lang="en-US" dirty="0"/>
           </a:p>
@@ -3659,7 +3659,7 @@
           <a:p>
             <a:fld id="{8AAA073D-A903-47F8-8D16-77642FB0DF1F}" type="datetimeFigureOut">
               <a:rPr lang="en-US" smtClean="0"/>
-              <a:t>4/4/2019</a:t>
+              <a:t>4/5/2019</a:t>
             </a:fld>
             <a:endParaRPr lang="en-US" dirty="0"/>
           </a:p>
@@ -3957,7 +3957,7 @@
           <a:p>
             <a:fld id="{AB91FA40-626B-4CA1-85D0-7A9016E395BA}" type="datetimeFigureOut">
               <a:rPr lang="en-US" smtClean="0"/>
-              <a:t>4/4/2019</a:t>
+              <a:t>4/5/2019</a:t>
             </a:fld>
             <a:endParaRPr lang="en-US" dirty="0"/>
           </a:p>
@@ -4401,7 +4401,7 @@
           <a:p>
             <a:fld id="{C3F425EA-B9DC-48A7-991E-9A82573B1B21}" type="datetimeFigureOut">
               <a:rPr lang="en-US" smtClean="0"/>
-              <a:t>4/4/2019</a:t>
+              <a:t>4/5/2019</a:t>
             </a:fld>
             <a:endParaRPr lang="en-US" dirty="0"/>
           </a:p>
@@ -4525,7 +4525,7 @@
           <a:p>
             <a:fld id="{66CB97F8-6CEB-469B-AFCC-889F2A2B1D5A}" type="datetimeFigureOut">
               <a:rPr lang="en-US" smtClean="0"/>
-              <a:t>4/4/2019</a:t>
+              <a:t>4/5/2019</a:t>
             </a:fld>
             <a:endParaRPr lang="en-US" dirty="0"/>
           </a:p>
@@ -4626,7 +4626,7 @@
           <a:p>
             <a:fld id="{8FA9179F-009E-4FA5-B091-7EBB82A185BD}" type="datetimeFigureOut">
               <a:rPr lang="en-US" smtClean="0"/>
-              <a:t>4/4/2019</a:t>
+              <a:t>4/5/2019</a:t>
             </a:fld>
             <a:endParaRPr lang="en-US" dirty="0"/>
           </a:p>
@@ -4911,7 +4911,7 @@
           <a:p>
             <a:fld id="{8E665CEB-0076-4E37-B880-BCEA9784DE0A}" type="datetimeFigureOut">
               <a:rPr lang="en-US" smtClean="0"/>
-              <a:t>4/4/2019</a:t>
+              <a:t>4/5/2019</a:t>
             </a:fld>
             <a:endParaRPr lang="en-US" dirty="0"/>
           </a:p>
@@ -5192,7 +5192,7 @@
           <a:p>
             <a:fld id="{A6149E5E-3896-4118-99A7-7B85668F1C5E}" type="datetimeFigureOut">
               <a:rPr lang="en-US" smtClean="0"/>
-              <a:t>4/4/2019</a:t>
+              <a:t>4/5/2019</a:t>
             </a:fld>
             <a:endParaRPr lang="en-US" dirty="0"/>
           </a:p>
@@ -5627,7 +5627,7 @@
           <a:p>
             <a:fld id="{7E0D914D-B099-4142-A885-11F276715148}" type="datetimeFigureOut">
               <a:rPr lang="en-US" smtClean="0"/>
-              <a:t>4/4/2019</a:t>
+              <a:t>4/5/2019</a:t>
             </a:fld>
             <a:endParaRPr lang="en-US" dirty="0"/>
           </a:p>
@@ -6732,31 +6732,35 @@
           </a:p>
         </p:txBody>
       </p:sp>
-      <p:sp>
-        <p:nvSpPr>
-          <p:cNvPr id="7" name="Content Placeholder 6">
+      <p:pic>
+        <p:nvPicPr>
+          <p:cNvPr id="6" name="Content Placeholder 5">
             <a:extLst>
               <a:ext uri="{FF2B5EF4-FFF2-40B4-BE49-F238E27FC236}">
-                <a16:creationId xmlns:a16="http://schemas.microsoft.com/office/drawing/2014/main" id="{B674B693-5D08-4228-91E4-7932611BA6F2}"/>
+                <a16:creationId xmlns:a16="http://schemas.microsoft.com/office/drawing/2014/main" id="{C0B990F3-4598-486D-AEEF-4CF3F5A15154}"/>
               </a:ext>
             </a:extLst>
           </p:cNvPr>
-          <p:cNvSpPr>
-            <a:spLocks noGrp="1"/>
-          </p:cNvSpPr>
+          <p:cNvPicPr>
+            <a:picLocks noGrp="1" noChangeAspect="1"/>
+          </p:cNvPicPr>
           <p:nvPr>
             <p:ph idx="1"/>
           </p:nvPr>
-        </p:nvSpPr>
-        <p:spPr/>
-        <p:txBody>
-          <a:bodyPr/>
-          <a:lstStyle/>
-          <a:p>
-            <a:endParaRPr lang="en-US"/>
-          </a:p>
-        </p:txBody>
-      </p:sp>
+        </p:nvPicPr>
+        <p:blipFill>
+          <a:blip r:embed="rId2"/>
+          <a:stretch>
+            <a:fillRect/>
+          </a:stretch>
+        </p:blipFill>
+        <p:spPr>
+          <a:xfrm>
+            <a:off x="1103313" y="2165460"/>
+            <a:ext cx="8947150" cy="3970118"/>
+          </a:xfrm>
+        </p:spPr>
+      </p:pic>
     </p:spTree>
     <p:extLst>
       <p:ext uri="{BB962C8B-B14F-4D97-AF65-F5344CB8AC3E}">

</xml_diff>